<commit_message>
add Alice and Bob example
</commit_message>
<xml_diff>
--- a/app/assets/images/cards.pptx
+++ b/app/assets/images/cards.pptx
@@ -13,6 +13,7 @@
     <p:sldId id="263" r:id="rId7"/>
     <p:sldId id="260" r:id="rId8"/>
     <p:sldId id="262" r:id="rId9"/>
+    <p:sldId id="264" r:id="rId10"/>
   </p:sldIdLst>
   <p:sldSz cx="9144000" cy="6858000" type="screen4x3"/>
   <p:notesSz cx="6858000" cy="9144000"/>
@@ -295,7 +296,7 @@
           <a:p>
             <a:fld id="{E90ED720-0104-4369-84BC-D37694168613}" type="datetimeFigureOut">
               <a:rPr kumimoji="1" lang="ja-JP" altLang="en-US" smtClean="0"/>
-              <a:t>2013/7/31</a:t>
+              <a:t>2013/8/2</a:t>
             </a:fld>
             <a:endParaRPr kumimoji="1" lang="ja-JP" altLang="en-US"/>
           </a:p>
@@ -492,7 +493,7 @@
           <a:p>
             <a:fld id="{E90ED720-0104-4369-84BC-D37694168613}" type="datetimeFigureOut">
               <a:rPr kumimoji="1" lang="ja-JP" altLang="en-US" smtClean="0"/>
-              <a:t>2013/7/31</a:t>
+              <a:t>2013/8/2</a:t>
             </a:fld>
             <a:endParaRPr kumimoji="1" lang="ja-JP" altLang="en-US"/>
           </a:p>
@@ -699,7 +700,7 @@
           <a:p>
             <a:fld id="{E90ED720-0104-4369-84BC-D37694168613}" type="datetimeFigureOut">
               <a:rPr kumimoji="1" lang="ja-JP" altLang="en-US" smtClean="0"/>
-              <a:t>2013/7/31</a:t>
+              <a:t>2013/8/2</a:t>
             </a:fld>
             <a:endParaRPr kumimoji="1" lang="ja-JP" altLang="en-US"/>
           </a:p>
@@ -896,7 +897,7 @@
           <a:p>
             <a:fld id="{E90ED720-0104-4369-84BC-D37694168613}" type="datetimeFigureOut">
               <a:rPr kumimoji="1" lang="ja-JP" altLang="en-US" smtClean="0"/>
-              <a:t>2013/7/31</a:t>
+              <a:t>2013/8/2</a:t>
             </a:fld>
             <a:endParaRPr kumimoji="1" lang="ja-JP" altLang="en-US"/>
           </a:p>
@@ -1137,7 +1138,7 @@
           <a:p>
             <a:fld id="{E90ED720-0104-4369-84BC-D37694168613}" type="datetimeFigureOut">
               <a:rPr kumimoji="1" lang="ja-JP" altLang="en-US" smtClean="0"/>
-              <a:t>2013/7/31</a:t>
+              <a:t>2013/8/2</a:t>
             </a:fld>
             <a:endParaRPr kumimoji="1" lang="ja-JP" altLang="en-US"/>
           </a:p>
@@ -1484,7 +1485,7 @@
           <a:p>
             <a:fld id="{E90ED720-0104-4369-84BC-D37694168613}" type="datetimeFigureOut">
               <a:rPr kumimoji="1" lang="ja-JP" altLang="en-US" smtClean="0"/>
-              <a:t>2013/7/31</a:t>
+              <a:t>2013/8/2</a:t>
             </a:fld>
             <a:endParaRPr kumimoji="1" lang="ja-JP" altLang="en-US"/>
           </a:p>
@@ -1965,7 +1966,7 @@
           <a:p>
             <a:fld id="{E90ED720-0104-4369-84BC-D37694168613}" type="datetimeFigureOut">
               <a:rPr kumimoji="1" lang="ja-JP" altLang="en-US" smtClean="0"/>
-              <a:t>2013/7/31</a:t>
+              <a:t>2013/8/2</a:t>
             </a:fld>
             <a:endParaRPr kumimoji="1" lang="ja-JP" altLang="en-US"/>
           </a:p>
@@ -2078,7 +2079,7 @@
           <a:p>
             <a:fld id="{E90ED720-0104-4369-84BC-D37694168613}" type="datetimeFigureOut">
               <a:rPr kumimoji="1" lang="ja-JP" altLang="en-US" smtClean="0"/>
-              <a:t>2013/7/31</a:t>
+              <a:t>2013/8/2</a:t>
             </a:fld>
             <a:endParaRPr kumimoji="1" lang="ja-JP" altLang="en-US"/>
           </a:p>
@@ -2168,7 +2169,7 @@
           <a:p>
             <a:fld id="{E90ED720-0104-4369-84BC-D37694168613}" type="datetimeFigureOut">
               <a:rPr kumimoji="1" lang="ja-JP" altLang="en-US" smtClean="0"/>
-              <a:t>2013/7/31</a:t>
+              <a:t>2013/8/2</a:t>
             </a:fld>
             <a:endParaRPr kumimoji="1" lang="ja-JP" altLang="en-US"/>
           </a:p>
@@ -2472,7 +2473,7 @@
           <a:p>
             <a:fld id="{E90ED720-0104-4369-84BC-D37694168613}" type="datetimeFigureOut">
               <a:rPr kumimoji="1" lang="ja-JP" altLang="en-US" smtClean="0"/>
-              <a:t>2013/7/31</a:t>
+              <a:t>2013/8/2</a:t>
             </a:fld>
             <a:endParaRPr kumimoji="1" lang="ja-JP" altLang="en-US"/>
           </a:p>
@@ -2720,7 +2721,7 @@
           <a:p>
             <a:fld id="{E90ED720-0104-4369-84BC-D37694168613}" type="datetimeFigureOut">
               <a:rPr kumimoji="1" lang="ja-JP" altLang="en-US" smtClean="0"/>
-              <a:t>2013/7/31</a:t>
+              <a:t>2013/8/2</a:t>
             </a:fld>
             <a:endParaRPr kumimoji="1" lang="ja-JP" altLang="en-US"/>
           </a:p>
@@ -2960,7 +2961,7 @@
           <a:p>
             <a:fld id="{E90ED720-0104-4369-84BC-D37694168613}" type="datetimeFigureOut">
               <a:rPr kumimoji="1" lang="ja-JP" altLang="en-US" smtClean="0"/>
-              <a:t>2013/7/31</a:t>
+              <a:t>2013/8/2</a:t>
             </a:fld>
             <a:endParaRPr kumimoji="1" lang="ja-JP" altLang="en-US"/>
           </a:p>
@@ -8862,11 +8863,6 @@
               </a:rPr>
               <a:t>A, B, …</a:t>
             </a:r>
-            <a:endParaRPr lang="en-US" altLang="ja-JP" dirty="0" smtClean="0">
-              <a:latin typeface="メイリオ" pitchFamily="50" charset="-128"/>
-              <a:ea typeface="メイリオ" pitchFamily="50" charset="-128"/>
-              <a:cs typeface="メイリオ" pitchFamily="50" charset="-128"/>
-            </a:endParaRPr>
           </a:p>
         </p:txBody>
       </p:sp>
@@ -9282,11 +9278,6 @@
               </a:rPr>
               <a:t>A, B, …</a:t>
             </a:r>
-            <a:endParaRPr lang="en-US" altLang="ja-JP" dirty="0" smtClean="0">
-              <a:latin typeface="メイリオ" pitchFamily="50" charset="-128"/>
-              <a:ea typeface="メイリオ" pitchFamily="50" charset="-128"/>
-              <a:cs typeface="メイリオ" pitchFamily="50" charset="-128"/>
-            </a:endParaRPr>
           </a:p>
         </p:txBody>
       </p:sp>
@@ -10240,10 +10231,6 @@
               </a:rPr>
               <a:t>)</a:t>
             </a:r>
-            <a:endParaRPr lang="en-US" altLang="ja-JP" dirty="0" smtClean="0">
-              <a:ea typeface="メイリオ" pitchFamily="50" charset="-128"/>
-              <a:cs typeface="メイリオ" pitchFamily="50" charset="-128"/>
-            </a:endParaRPr>
           </a:p>
         </p:txBody>
       </p:sp>
@@ -10622,10 +10609,6 @@
               </a:rPr>
               <a:t>)</a:t>
             </a:r>
-            <a:endParaRPr lang="en-US" altLang="ja-JP" dirty="0" smtClean="0">
-              <a:ea typeface="メイリオ" pitchFamily="50" charset="-128"/>
-              <a:cs typeface="メイリオ" pitchFamily="50" charset="-128"/>
-            </a:endParaRPr>
           </a:p>
         </p:txBody>
       </p:sp>
@@ -11292,6 +11275,1261 @@
     <p:extLst>
       <p:ext uri="{BB962C8B-B14F-4D97-AF65-F5344CB8AC3E}">
         <p14:creationId xmlns:p14="http://schemas.microsoft.com/office/powerpoint/2010/main" val="2023541163"/>
+      </p:ext>
+    </p:extLst>
+  </p:cSld>
+  <p:clrMapOvr>
+    <a:masterClrMapping/>
+  </p:clrMapOvr>
+</p:sld>
+</file>
+
+<file path=ppt/slides/slide9.xml><?xml version="1.0" encoding="utf-8"?>
+<p:sld xmlns:a="http://schemas.openxmlformats.org/drawingml/2006/main" xmlns:r="http://schemas.openxmlformats.org/officeDocument/2006/relationships" xmlns:p="http://schemas.openxmlformats.org/presentationml/2006/main">
+  <p:cSld>
+    <p:spTree>
+      <p:nvGrpSpPr>
+        <p:cNvPr id="1" name=""/>
+        <p:cNvGrpSpPr/>
+        <p:nvPr/>
+      </p:nvGrpSpPr>
+      <p:grpSpPr>
+        <a:xfrm>
+          <a:off x="0" y="0"/>
+          <a:ext cx="0" cy="0"/>
+          <a:chOff x="0" y="0"/>
+          <a:chExt cx="0" cy="0"/>
+        </a:xfrm>
+      </p:grpSpPr>
+      <p:grpSp>
+        <p:nvGrpSpPr>
+          <p:cNvPr id="2" name="グループ化 1"/>
+          <p:cNvGrpSpPr/>
+          <p:nvPr/>
+        </p:nvGrpSpPr>
+        <p:grpSpPr>
+          <a:xfrm>
+            <a:off x="5529314" y="2924942"/>
+            <a:ext cx="3219151" cy="1557175"/>
+            <a:chOff x="5508819" y="2325249"/>
+            <a:chExt cx="3621545" cy="1751822"/>
+          </a:xfrm>
+        </p:grpSpPr>
+        <p:sp>
+          <p:nvSpPr>
+            <p:cNvPr id="3" name="フローチャート : 代替処理 2"/>
+            <p:cNvSpPr/>
+            <p:nvPr/>
+          </p:nvSpPr>
+          <p:spPr>
+            <a:xfrm>
+              <a:off x="5508819" y="2325249"/>
+              <a:ext cx="3621545" cy="1751822"/>
+            </a:xfrm>
+            <a:prstGeom prst="flowChartAlternateProcess">
+              <a:avLst/>
+            </a:prstGeom>
+          </p:spPr>
+          <p:style>
+            <a:lnRef idx="1">
+              <a:schemeClr val="accent1"/>
+            </a:lnRef>
+            <a:fillRef idx="2">
+              <a:schemeClr val="accent1"/>
+            </a:fillRef>
+            <a:effectRef idx="1">
+              <a:schemeClr val="accent1"/>
+            </a:effectRef>
+            <a:fontRef idx="minor">
+              <a:schemeClr val="dk1"/>
+            </a:fontRef>
+          </p:style>
+          <p:txBody>
+            <a:bodyPr rtlCol="0" anchor="ctr"/>
+            <a:lstStyle/>
+            <a:p>
+              <a:pPr algn="ctr"/>
+              <a:endParaRPr kumimoji="1" lang="ja-JP" altLang="en-US" sz="1600" dirty="0">
+                <a:latin typeface="メイリオ" pitchFamily="50" charset="-128"/>
+                <a:ea typeface="メイリオ" pitchFamily="50" charset="-128"/>
+                <a:cs typeface="メイリオ" pitchFamily="50" charset="-128"/>
+              </a:endParaRPr>
+            </a:p>
+          </p:txBody>
+        </p:sp>
+        <p:sp>
+          <p:nvSpPr>
+            <p:cNvPr id="4" name="フローチャート : 代替処理 3"/>
+            <p:cNvSpPr/>
+            <p:nvPr/>
+          </p:nvSpPr>
+          <p:spPr>
+            <a:xfrm>
+              <a:off x="7996237" y="2475696"/>
+              <a:ext cx="943818" cy="578636"/>
+            </a:xfrm>
+            <a:prstGeom prst="flowChartAlternateProcess">
+              <a:avLst/>
+            </a:prstGeom>
+          </p:spPr>
+          <p:style>
+            <a:lnRef idx="1">
+              <a:schemeClr val="accent1"/>
+            </a:lnRef>
+            <a:fillRef idx="2">
+              <a:schemeClr val="accent1"/>
+            </a:fillRef>
+            <a:effectRef idx="1">
+              <a:schemeClr val="accent1"/>
+            </a:effectRef>
+            <a:fontRef idx="minor">
+              <a:schemeClr val="dk1"/>
+            </a:fontRef>
+          </p:style>
+          <p:txBody>
+            <a:bodyPr wrap="none" rtlCol="0" anchor="ctr"/>
+            <a:lstStyle/>
+            <a:p>
+              <a:pPr algn="ctr"/>
+              <a:r>
+                <a:rPr kumimoji="1" lang="ja-JP" altLang="en-US" sz="1400" dirty="0" smtClean="0">
+                  <a:latin typeface="メイリオ" pitchFamily="50" charset="-128"/>
+                  <a:ea typeface="メイリオ" pitchFamily="50" charset="-128"/>
+                  <a:cs typeface="メイリオ" pitchFamily="50" charset="-128"/>
+                </a:rPr>
+                <a:t>ボブ</a:t>
+              </a:r>
+              <a:endParaRPr kumimoji="1" lang="en-US" altLang="ja-JP" sz="1400" dirty="0" smtClean="0">
+                <a:latin typeface="メイリオ" pitchFamily="50" charset="-128"/>
+                <a:ea typeface="メイリオ" pitchFamily="50" charset="-128"/>
+                <a:cs typeface="メイリオ" pitchFamily="50" charset="-128"/>
+              </a:endParaRPr>
+            </a:p>
+            <a:p>
+              <a:pPr algn="ctr"/>
+              <a:r>
+                <a:rPr kumimoji="1" lang="ja-JP" altLang="en-US" sz="1400" dirty="0" smtClean="0">
+                  <a:latin typeface="メイリオ" pitchFamily="50" charset="-128"/>
+                  <a:ea typeface="メイリオ" pitchFamily="50" charset="-128"/>
+                  <a:cs typeface="メイリオ" pitchFamily="50" charset="-128"/>
+                </a:rPr>
+                <a:t>（受信者）</a:t>
+              </a:r>
+              <a:endParaRPr kumimoji="1" lang="ja-JP" altLang="en-US" sz="1400" dirty="0">
+                <a:latin typeface="メイリオ" pitchFamily="50" charset="-128"/>
+                <a:ea typeface="メイリオ" pitchFamily="50" charset="-128"/>
+                <a:cs typeface="メイリオ" pitchFamily="50" charset="-128"/>
+              </a:endParaRPr>
+            </a:p>
+          </p:txBody>
+        </p:sp>
+        <p:sp>
+          <p:nvSpPr>
+            <p:cNvPr id="5" name="正方形/長方形 4"/>
+            <p:cNvSpPr/>
+            <p:nvPr/>
+          </p:nvSpPr>
+          <p:spPr>
+            <a:xfrm>
+              <a:off x="7996237" y="3354422"/>
+              <a:ext cx="943818" cy="479624"/>
+            </a:xfrm>
+            <a:prstGeom prst="rect">
+              <a:avLst/>
+            </a:prstGeom>
+          </p:spPr>
+          <p:style>
+            <a:lnRef idx="1">
+              <a:schemeClr val="dk1"/>
+            </a:lnRef>
+            <a:fillRef idx="2">
+              <a:schemeClr val="dk1"/>
+            </a:fillRef>
+            <a:effectRef idx="1">
+              <a:schemeClr val="dk1"/>
+            </a:effectRef>
+            <a:fontRef idx="minor">
+              <a:schemeClr val="dk1"/>
+            </a:fontRef>
+          </p:style>
+          <p:txBody>
+            <a:bodyPr wrap="none" rtlCol="0" anchor="ctr"/>
+            <a:lstStyle/>
+            <a:p>
+              <a:pPr algn="ctr"/>
+              <a:r>
+                <a:rPr lang="ja-JP" altLang="en-US" sz="1400" dirty="0">
+                  <a:latin typeface="メイリオ" pitchFamily="50" charset="-128"/>
+                  <a:ea typeface="メイリオ" pitchFamily="50" charset="-128"/>
+                  <a:cs typeface="メイリオ" pitchFamily="50" charset="-128"/>
+                </a:rPr>
+                <a:t>平文</a:t>
+              </a:r>
+              <a:endParaRPr kumimoji="1" lang="en-US" altLang="ja-JP" sz="1400" dirty="0" smtClean="0">
+                <a:latin typeface="メイリオ" pitchFamily="50" charset="-128"/>
+                <a:ea typeface="メイリオ" pitchFamily="50" charset="-128"/>
+                <a:cs typeface="メイリオ" pitchFamily="50" charset="-128"/>
+              </a:endParaRPr>
+            </a:p>
+          </p:txBody>
+        </p:sp>
+        <p:cxnSp>
+          <p:nvCxnSpPr>
+            <p:cNvPr id="6" name="直線矢印コネクタ 5"/>
+            <p:cNvCxnSpPr>
+              <a:stCxn id="4" idx="2"/>
+              <a:endCxn id="5" idx="0"/>
+            </p:cNvCxnSpPr>
+            <p:nvPr/>
+          </p:nvCxnSpPr>
+          <p:spPr>
+            <a:xfrm>
+              <a:off x="8468146" y="3054332"/>
+              <a:ext cx="0" cy="300089"/>
+            </a:xfrm>
+            <a:prstGeom prst="straightConnector1">
+              <a:avLst/>
+            </a:prstGeom>
+            <a:ln w="38100">
+              <a:solidFill>
+                <a:schemeClr val="tx1"/>
+              </a:solidFill>
+              <a:headEnd type="arrow" w="med" len="med"/>
+              <a:tailEnd type="none" w="med" len="med"/>
+            </a:ln>
+          </p:spPr>
+          <p:style>
+            <a:lnRef idx="1">
+              <a:schemeClr val="accent1"/>
+            </a:lnRef>
+            <a:fillRef idx="0">
+              <a:schemeClr val="accent1"/>
+            </a:fillRef>
+            <a:effectRef idx="0">
+              <a:schemeClr val="accent1"/>
+            </a:effectRef>
+            <a:fontRef idx="minor">
+              <a:schemeClr val="tx1"/>
+            </a:fontRef>
+          </p:style>
+        </p:cxnSp>
+      </p:grpSp>
+      <p:grpSp>
+        <p:nvGrpSpPr>
+          <p:cNvPr id="7" name="グループ化 6"/>
+          <p:cNvGrpSpPr/>
+          <p:nvPr/>
+        </p:nvGrpSpPr>
+        <p:grpSpPr>
+          <a:xfrm>
+            <a:off x="755574" y="2924942"/>
+            <a:ext cx="3168353" cy="1557173"/>
+            <a:chOff x="755574" y="2663913"/>
+            <a:chExt cx="3168353" cy="1557173"/>
+          </a:xfrm>
+        </p:grpSpPr>
+        <p:grpSp>
+          <p:nvGrpSpPr>
+            <p:cNvPr id="8" name="グループ化 7"/>
+            <p:cNvGrpSpPr/>
+            <p:nvPr/>
+          </p:nvGrpSpPr>
+          <p:grpSpPr>
+            <a:xfrm>
+              <a:off x="755574" y="2663913"/>
+              <a:ext cx="3168353" cy="1557173"/>
+              <a:chOff x="796720" y="2469267"/>
+              <a:chExt cx="3564399" cy="1751820"/>
+            </a:xfrm>
+          </p:grpSpPr>
+          <p:sp>
+            <p:nvSpPr>
+              <p:cNvPr id="13" name="フローチャート : 代替処理 12"/>
+              <p:cNvSpPr/>
+              <p:nvPr/>
+            </p:nvSpPr>
+            <p:spPr>
+              <a:xfrm>
+                <a:off x="796720" y="2469267"/>
+                <a:ext cx="3564399" cy="1751820"/>
+              </a:xfrm>
+              <a:prstGeom prst="flowChartAlternateProcess">
+                <a:avLst/>
+              </a:prstGeom>
+            </p:spPr>
+            <p:style>
+              <a:lnRef idx="1">
+                <a:schemeClr val="accent1"/>
+              </a:lnRef>
+              <a:fillRef idx="2">
+                <a:schemeClr val="accent1"/>
+              </a:fillRef>
+              <a:effectRef idx="1">
+                <a:schemeClr val="accent1"/>
+              </a:effectRef>
+              <a:fontRef idx="minor">
+                <a:schemeClr val="dk1"/>
+              </a:fontRef>
+            </p:style>
+            <p:txBody>
+              <a:bodyPr rtlCol="0" anchor="ctr"/>
+              <a:lstStyle/>
+              <a:p>
+                <a:pPr algn="ctr"/>
+                <a:endParaRPr kumimoji="1" lang="ja-JP" altLang="en-US" sz="1400" dirty="0">
+                  <a:latin typeface="メイリオ" pitchFamily="50" charset="-128"/>
+                  <a:ea typeface="メイリオ" pitchFamily="50" charset="-128"/>
+                  <a:cs typeface="メイリオ" pitchFamily="50" charset="-128"/>
+                </a:endParaRPr>
+              </a:p>
+            </p:txBody>
+          </p:sp>
+          <p:sp>
+            <p:nvSpPr>
+              <p:cNvPr id="14" name="フローチャート : 代替処理 13"/>
+              <p:cNvSpPr/>
+              <p:nvPr/>
+            </p:nvSpPr>
+            <p:spPr>
+              <a:xfrm>
+                <a:off x="909878" y="2619714"/>
+                <a:ext cx="939960" cy="578636"/>
+              </a:xfrm>
+              <a:prstGeom prst="flowChartAlternateProcess">
+                <a:avLst/>
+              </a:prstGeom>
+            </p:spPr>
+            <p:style>
+              <a:lnRef idx="1">
+                <a:schemeClr val="accent1"/>
+              </a:lnRef>
+              <a:fillRef idx="2">
+                <a:schemeClr val="accent1"/>
+              </a:fillRef>
+              <a:effectRef idx="1">
+                <a:schemeClr val="accent1"/>
+              </a:effectRef>
+              <a:fontRef idx="minor">
+                <a:schemeClr val="dk1"/>
+              </a:fontRef>
+            </p:style>
+            <p:txBody>
+              <a:bodyPr wrap="none" rtlCol="0" anchor="ctr"/>
+              <a:lstStyle/>
+              <a:p>
+                <a:pPr algn="ctr"/>
+                <a:r>
+                  <a:rPr kumimoji="1" lang="ja-JP" altLang="en-US" sz="1400" dirty="0" smtClean="0">
+                    <a:latin typeface="メイリオ" pitchFamily="50" charset="-128"/>
+                    <a:ea typeface="メイリオ" pitchFamily="50" charset="-128"/>
+                    <a:cs typeface="メイリオ" pitchFamily="50" charset="-128"/>
+                  </a:rPr>
+                  <a:t>アリス</a:t>
+                </a:r>
+                <a:endParaRPr kumimoji="1" lang="en-US" altLang="ja-JP" sz="1400" dirty="0" smtClean="0">
+                  <a:latin typeface="メイリオ" pitchFamily="50" charset="-128"/>
+                  <a:ea typeface="メイリオ" pitchFamily="50" charset="-128"/>
+                  <a:cs typeface="メイリオ" pitchFamily="50" charset="-128"/>
+                </a:endParaRPr>
+              </a:p>
+              <a:p>
+                <a:pPr algn="ctr"/>
+                <a:r>
+                  <a:rPr kumimoji="1" lang="ja-JP" altLang="en-US" sz="1400" dirty="0" smtClean="0">
+                    <a:latin typeface="メイリオ" pitchFamily="50" charset="-128"/>
+                    <a:ea typeface="メイリオ" pitchFamily="50" charset="-128"/>
+                    <a:cs typeface="メイリオ" pitchFamily="50" charset="-128"/>
+                  </a:rPr>
+                  <a:t>（送信者）</a:t>
+                </a:r>
+                <a:endParaRPr kumimoji="1" lang="ja-JP" altLang="en-US" sz="1400" dirty="0">
+                  <a:latin typeface="メイリオ" pitchFamily="50" charset="-128"/>
+                  <a:ea typeface="メイリオ" pitchFamily="50" charset="-128"/>
+                  <a:cs typeface="メイリオ" pitchFamily="50" charset="-128"/>
+                </a:endParaRPr>
+              </a:p>
+            </p:txBody>
+          </p:sp>
+          <p:sp>
+            <p:nvSpPr>
+              <p:cNvPr id="15" name="正方形/長方形 14"/>
+              <p:cNvSpPr/>
+              <p:nvPr/>
+            </p:nvSpPr>
+            <p:spPr>
+              <a:xfrm>
+                <a:off x="909878" y="3498436"/>
+                <a:ext cx="939961" cy="479625"/>
+              </a:xfrm>
+              <a:prstGeom prst="rect">
+                <a:avLst/>
+              </a:prstGeom>
+            </p:spPr>
+            <p:style>
+              <a:lnRef idx="1">
+                <a:schemeClr val="dk1"/>
+              </a:lnRef>
+              <a:fillRef idx="2">
+                <a:schemeClr val="dk1"/>
+              </a:fillRef>
+              <a:effectRef idx="1">
+                <a:schemeClr val="dk1"/>
+              </a:effectRef>
+              <a:fontRef idx="minor">
+                <a:schemeClr val="dk1"/>
+              </a:fontRef>
+            </p:style>
+            <p:txBody>
+              <a:bodyPr wrap="none" rtlCol="0" anchor="ctr"/>
+              <a:lstStyle/>
+              <a:p>
+                <a:pPr algn="ctr"/>
+                <a:r>
+                  <a:rPr lang="ja-JP" altLang="en-US" sz="1400" dirty="0">
+                    <a:latin typeface="メイリオ" pitchFamily="50" charset="-128"/>
+                    <a:ea typeface="メイリオ" pitchFamily="50" charset="-128"/>
+                    <a:cs typeface="メイリオ" pitchFamily="50" charset="-128"/>
+                  </a:rPr>
+                  <a:t>平</a:t>
+                </a:r>
+                <a:r>
+                  <a:rPr lang="ja-JP" altLang="en-US" sz="1400" dirty="0" smtClean="0">
+                    <a:latin typeface="メイリオ" pitchFamily="50" charset="-128"/>
+                    <a:ea typeface="メイリオ" pitchFamily="50" charset="-128"/>
+                    <a:cs typeface="メイリオ" pitchFamily="50" charset="-128"/>
+                  </a:rPr>
+                  <a:t>文</a:t>
+                </a:r>
+                <a:endParaRPr kumimoji="1" lang="en-US" altLang="ja-JP" sz="1400" dirty="0" smtClean="0">
+                  <a:latin typeface="メイリオ" pitchFamily="50" charset="-128"/>
+                  <a:ea typeface="メイリオ" pitchFamily="50" charset="-128"/>
+                  <a:cs typeface="メイリオ" pitchFamily="50" charset="-128"/>
+                </a:endParaRPr>
+              </a:p>
+            </p:txBody>
+          </p:sp>
+          <p:cxnSp>
+            <p:nvCxnSpPr>
+              <p:cNvPr id="16" name="直線矢印コネクタ 15"/>
+              <p:cNvCxnSpPr>
+                <a:stCxn id="14" idx="2"/>
+                <a:endCxn id="15" idx="0"/>
+              </p:cNvCxnSpPr>
+              <p:nvPr/>
+            </p:nvCxnSpPr>
+            <p:spPr>
+              <a:xfrm>
+                <a:off x="1379858" y="3198350"/>
+                <a:ext cx="0" cy="300086"/>
+              </a:xfrm>
+              <a:prstGeom prst="straightConnector1">
+                <a:avLst/>
+              </a:prstGeom>
+              <a:ln w="38100">
+                <a:solidFill>
+                  <a:schemeClr val="tx1"/>
+                </a:solidFill>
+                <a:tailEnd type="arrow"/>
+              </a:ln>
+            </p:spPr>
+            <p:style>
+              <a:lnRef idx="1">
+                <a:schemeClr val="accent1"/>
+              </a:lnRef>
+              <a:fillRef idx="0">
+                <a:schemeClr val="accent1"/>
+              </a:fillRef>
+              <a:effectRef idx="0">
+                <a:schemeClr val="accent1"/>
+              </a:effectRef>
+              <a:fontRef idx="minor">
+                <a:schemeClr val="tx1"/>
+              </a:fontRef>
+            </p:style>
+          </p:cxnSp>
+        </p:grpSp>
+        <p:sp>
+          <p:nvSpPr>
+            <p:cNvPr id="9" name="フローチャート : 代替処理 8"/>
+            <p:cNvSpPr/>
+            <p:nvPr/>
+          </p:nvSpPr>
+          <p:spPr>
+            <a:xfrm>
+              <a:off x="1969469" y="3606733"/>
+              <a:ext cx="730323" cy="398331"/>
+            </a:xfrm>
+            <a:prstGeom prst="flowChartAlternateProcess">
+              <a:avLst/>
+            </a:prstGeom>
+          </p:spPr>
+          <p:style>
+            <a:lnRef idx="1">
+              <a:schemeClr val="accent3"/>
+            </a:lnRef>
+            <a:fillRef idx="2">
+              <a:schemeClr val="accent3"/>
+            </a:fillRef>
+            <a:effectRef idx="1">
+              <a:schemeClr val="accent3"/>
+            </a:effectRef>
+            <a:fontRef idx="minor">
+              <a:schemeClr val="dk1"/>
+            </a:fontRef>
+          </p:style>
+          <p:txBody>
+            <a:bodyPr wrap="none" rtlCol="0" anchor="ctr"/>
+            <a:lstStyle/>
+            <a:p>
+              <a:pPr algn="ctr"/>
+              <a:r>
+                <a:rPr kumimoji="1" lang="ja-JP" altLang="en-US" sz="1400" dirty="0" smtClean="0">
+                  <a:latin typeface="メイリオ" pitchFamily="50" charset="-128"/>
+                  <a:ea typeface="メイリオ" pitchFamily="50" charset="-128"/>
+                  <a:cs typeface="メイリオ" pitchFamily="50" charset="-128"/>
+                </a:rPr>
+                <a:t>暗号化</a:t>
+              </a:r>
+              <a:endParaRPr kumimoji="1" lang="ja-JP" altLang="en-US" sz="1400" dirty="0">
+                <a:latin typeface="メイリオ" pitchFamily="50" charset="-128"/>
+                <a:ea typeface="メイリオ" pitchFamily="50" charset="-128"/>
+                <a:cs typeface="メイリオ" pitchFamily="50" charset="-128"/>
+              </a:endParaRPr>
+            </a:p>
+          </p:txBody>
+        </p:sp>
+        <p:sp>
+          <p:nvSpPr>
+            <p:cNvPr id="10" name="正方形/長方形 9"/>
+            <p:cNvSpPr/>
+            <p:nvPr/>
+          </p:nvSpPr>
+          <p:spPr>
+            <a:xfrm>
+              <a:off x="2987824" y="3592731"/>
+              <a:ext cx="835521" cy="426333"/>
+            </a:xfrm>
+            <a:prstGeom prst="rect">
+              <a:avLst/>
+            </a:prstGeom>
+          </p:spPr>
+          <p:style>
+            <a:lnRef idx="1">
+              <a:schemeClr val="accent5"/>
+            </a:lnRef>
+            <a:fillRef idx="2">
+              <a:schemeClr val="accent5"/>
+            </a:fillRef>
+            <a:effectRef idx="1">
+              <a:schemeClr val="accent5"/>
+            </a:effectRef>
+            <a:fontRef idx="minor">
+              <a:schemeClr val="dk1"/>
+            </a:fontRef>
+          </p:style>
+          <p:txBody>
+            <a:bodyPr wrap="none" rtlCol="0" anchor="ctr"/>
+            <a:lstStyle/>
+            <a:p>
+              <a:pPr algn="ctr"/>
+              <a:r>
+                <a:rPr lang="ja-JP" altLang="en-US" sz="1400" dirty="0">
+                  <a:latin typeface="メイリオ" pitchFamily="50" charset="-128"/>
+                  <a:ea typeface="メイリオ" pitchFamily="50" charset="-128"/>
+                  <a:cs typeface="メイリオ" pitchFamily="50" charset="-128"/>
+                </a:rPr>
+                <a:t>暗号文</a:t>
+              </a:r>
+              <a:endParaRPr kumimoji="1" lang="en-US" altLang="ja-JP" sz="1400" dirty="0" smtClean="0">
+                <a:latin typeface="メイリオ" pitchFamily="50" charset="-128"/>
+                <a:ea typeface="メイリオ" pitchFamily="50" charset="-128"/>
+                <a:cs typeface="メイリオ" pitchFamily="50" charset="-128"/>
+              </a:endParaRPr>
+            </a:p>
+          </p:txBody>
+        </p:sp>
+        <p:cxnSp>
+          <p:nvCxnSpPr>
+            <p:cNvPr id="11" name="直線矢印コネクタ 10"/>
+            <p:cNvCxnSpPr>
+              <a:endCxn id="9" idx="1"/>
+            </p:cNvCxnSpPr>
+            <p:nvPr/>
+          </p:nvCxnSpPr>
+          <p:spPr>
+            <a:xfrm>
+              <a:off x="1715665" y="3805898"/>
+              <a:ext cx="253804" cy="1"/>
+            </a:xfrm>
+            <a:prstGeom prst="straightConnector1">
+              <a:avLst/>
+            </a:prstGeom>
+            <a:ln w="38100">
+              <a:solidFill>
+                <a:schemeClr val="tx1"/>
+              </a:solidFill>
+              <a:headEnd type="none" w="med" len="med"/>
+              <a:tailEnd type="arrow" w="med" len="med"/>
+            </a:ln>
+          </p:spPr>
+          <p:style>
+            <a:lnRef idx="1">
+              <a:schemeClr val="accent1"/>
+            </a:lnRef>
+            <a:fillRef idx="0">
+              <a:schemeClr val="accent1"/>
+            </a:fillRef>
+            <a:effectRef idx="0">
+              <a:schemeClr val="accent1"/>
+            </a:effectRef>
+            <a:fontRef idx="minor">
+              <a:schemeClr val="tx1"/>
+            </a:fontRef>
+          </p:style>
+        </p:cxnSp>
+        <p:cxnSp>
+          <p:nvCxnSpPr>
+            <p:cNvPr id="12" name="直線矢印コネクタ 11"/>
+            <p:cNvCxnSpPr/>
+            <p:nvPr/>
+          </p:nvCxnSpPr>
+          <p:spPr>
+            <a:xfrm>
+              <a:off x="2704034" y="3822276"/>
+              <a:ext cx="253804" cy="1"/>
+            </a:xfrm>
+            <a:prstGeom prst="straightConnector1">
+              <a:avLst/>
+            </a:prstGeom>
+            <a:ln w="38100">
+              <a:solidFill>
+                <a:schemeClr val="tx1"/>
+              </a:solidFill>
+              <a:headEnd type="none" w="med" len="med"/>
+              <a:tailEnd type="arrow" w="med" len="med"/>
+            </a:ln>
+          </p:spPr>
+          <p:style>
+            <a:lnRef idx="1">
+              <a:schemeClr val="accent1"/>
+            </a:lnRef>
+            <a:fillRef idx="0">
+              <a:schemeClr val="accent1"/>
+            </a:fillRef>
+            <a:effectRef idx="0">
+              <a:schemeClr val="accent1"/>
+            </a:effectRef>
+            <a:fontRef idx="minor">
+              <a:schemeClr val="tx1"/>
+            </a:fontRef>
+          </p:style>
+        </p:cxnSp>
+      </p:grpSp>
+      <p:sp>
+        <p:nvSpPr>
+          <p:cNvPr id="17" name="フローチャート : 代替処理 16"/>
+          <p:cNvSpPr/>
+          <p:nvPr/>
+        </p:nvSpPr>
+        <p:spPr>
+          <a:xfrm>
+            <a:off x="6750571" y="3884332"/>
+            <a:ext cx="730323" cy="398331"/>
+          </a:xfrm>
+          <a:prstGeom prst="flowChartAlternateProcess">
+            <a:avLst/>
+          </a:prstGeom>
+        </p:spPr>
+        <p:style>
+          <a:lnRef idx="1">
+            <a:schemeClr val="accent3"/>
+          </a:lnRef>
+          <a:fillRef idx="2">
+            <a:schemeClr val="accent3"/>
+          </a:fillRef>
+          <a:effectRef idx="1">
+            <a:schemeClr val="accent3"/>
+          </a:effectRef>
+          <a:fontRef idx="minor">
+            <a:schemeClr val="dk1"/>
+          </a:fontRef>
+        </p:style>
+        <p:txBody>
+          <a:bodyPr wrap="none" rtlCol="0" anchor="ctr"/>
+          <a:lstStyle/>
+          <a:p>
+            <a:pPr algn="ctr"/>
+            <a:r>
+              <a:rPr lang="ja-JP" altLang="en-US" sz="1400" dirty="0">
+                <a:latin typeface="メイリオ" pitchFamily="50" charset="-128"/>
+                <a:ea typeface="メイリオ" pitchFamily="50" charset="-128"/>
+                <a:cs typeface="メイリオ" pitchFamily="50" charset="-128"/>
+              </a:rPr>
+              <a:t>復号化</a:t>
+            </a:r>
+            <a:endParaRPr kumimoji="1" lang="ja-JP" altLang="en-US" sz="1400" dirty="0">
+              <a:latin typeface="メイリオ" pitchFamily="50" charset="-128"/>
+              <a:ea typeface="メイリオ" pitchFamily="50" charset="-128"/>
+              <a:cs typeface="メイリオ" pitchFamily="50" charset="-128"/>
+            </a:endParaRPr>
+          </a:p>
+        </p:txBody>
+      </p:sp>
+      <p:sp>
+        <p:nvSpPr>
+          <p:cNvPr id="18" name="正方形/長方形 17"/>
+          <p:cNvSpPr/>
+          <p:nvPr/>
+        </p:nvSpPr>
+        <p:spPr>
+          <a:xfrm>
+            <a:off x="5661246" y="3870331"/>
+            <a:ext cx="835521" cy="426333"/>
+          </a:xfrm>
+          <a:prstGeom prst="rect">
+            <a:avLst/>
+          </a:prstGeom>
+        </p:spPr>
+        <p:style>
+          <a:lnRef idx="1">
+            <a:schemeClr val="accent5"/>
+          </a:lnRef>
+          <a:fillRef idx="2">
+            <a:schemeClr val="accent5"/>
+          </a:fillRef>
+          <a:effectRef idx="1">
+            <a:schemeClr val="accent5"/>
+          </a:effectRef>
+          <a:fontRef idx="minor">
+            <a:schemeClr val="dk1"/>
+          </a:fontRef>
+        </p:style>
+        <p:txBody>
+          <a:bodyPr wrap="none" rtlCol="0" anchor="ctr"/>
+          <a:lstStyle/>
+          <a:p>
+            <a:pPr algn="ctr"/>
+            <a:r>
+              <a:rPr lang="ja-JP" altLang="en-US" sz="1400" dirty="0">
+                <a:latin typeface="メイリオ" pitchFamily="50" charset="-128"/>
+                <a:ea typeface="メイリオ" pitchFamily="50" charset="-128"/>
+                <a:cs typeface="メイリオ" pitchFamily="50" charset="-128"/>
+              </a:rPr>
+              <a:t>暗号文</a:t>
+            </a:r>
+            <a:endParaRPr kumimoji="1" lang="en-US" altLang="ja-JP" sz="1400" dirty="0" smtClean="0">
+              <a:latin typeface="メイリオ" pitchFamily="50" charset="-128"/>
+              <a:ea typeface="メイリオ" pitchFamily="50" charset="-128"/>
+              <a:cs typeface="メイリオ" pitchFamily="50" charset="-128"/>
+            </a:endParaRPr>
+          </a:p>
+        </p:txBody>
+      </p:sp>
+      <p:cxnSp>
+        <p:nvCxnSpPr>
+          <p:cNvPr id="19" name="直線矢印コネクタ 18"/>
+          <p:cNvCxnSpPr>
+            <a:stCxn id="18" idx="3"/>
+            <a:endCxn id="17" idx="1"/>
+          </p:cNvCxnSpPr>
+          <p:nvPr/>
+        </p:nvCxnSpPr>
+        <p:spPr>
+          <a:xfrm>
+            <a:off x="6496767" y="4083498"/>
+            <a:ext cx="253804" cy="0"/>
+          </a:xfrm>
+          <a:prstGeom prst="straightConnector1">
+            <a:avLst/>
+          </a:prstGeom>
+          <a:ln w="38100">
+            <a:solidFill>
+              <a:schemeClr val="tx1"/>
+            </a:solidFill>
+            <a:headEnd type="none" w="med" len="med"/>
+            <a:tailEnd type="arrow" w="med" len="med"/>
+          </a:ln>
+        </p:spPr>
+        <p:style>
+          <a:lnRef idx="1">
+            <a:schemeClr val="accent1"/>
+          </a:lnRef>
+          <a:fillRef idx="0">
+            <a:schemeClr val="accent1"/>
+          </a:fillRef>
+          <a:effectRef idx="0">
+            <a:schemeClr val="accent1"/>
+          </a:effectRef>
+          <a:fontRef idx="minor">
+            <a:schemeClr val="tx1"/>
+          </a:fontRef>
+        </p:style>
+      </p:cxnSp>
+      <p:cxnSp>
+        <p:nvCxnSpPr>
+          <p:cNvPr id="20" name="直線矢印コネクタ 19"/>
+          <p:cNvCxnSpPr/>
+          <p:nvPr/>
+        </p:nvCxnSpPr>
+        <p:spPr>
+          <a:xfrm>
+            <a:off x="7485136" y="4083497"/>
+            <a:ext cx="253804" cy="1"/>
+          </a:xfrm>
+          <a:prstGeom prst="straightConnector1">
+            <a:avLst/>
+          </a:prstGeom>
+          <a:ln w="38100">
+            <a:solidFill>
+              <a:schemeClr val="tx1"/>
+            </a:solidFill>
+            <a:headEnd type="none" w="med" len="med"/>
+            <a:tailEnd type="arrow" w="med" len="med"/>
+          </a:ln>
+        </p:spPr>
+        <p:style>
+          <a:lnRef idx="1">
+            <a:schemeClr val="accent1"/>
+          </a:lnRef>
+          <a:fillRef idx="0">
+            <a:schemeClr val="accent1"/>
+          </a:fillRef>
+          <a:effectRef idx="0">
+            <a:schemeClr val="accent1"/>
+          </a:effectRef>
+          <a:fontRef idx="minor">
+            <a:schemeClr val="tx1"/>
+          </a:fontRef>
+        </p:style>
+      </p:cxnSp>
+      <p:cxnSp>
+        <p:nvCxnSpPr>
+          <p:cNvPr id="21" name="直線矢印コネクタ 20"/>
+          <p:cNvCxnSpPr/>
+          <p:nvPr/>
+        </p:nvCxnSpPr>
+        <p:spPr>
+          <a:xfrm>
+            <a:off x="3851920" y="4083497"/>
+            <a:ext cx="1783089" cy="0"/>
+          </a:xfrm>
+          <a:prstGeom prst="straightConnector1">
+            <a:avLst/>
+          </a:prstGeom>
+          <a:ln w="38100">
+            <a:solidFill>
+              <a:schemeClr val="tx1"/>
+            </a:solidFill>
+            <a:headEnd type="none" w="med" len="med"/>
+            <a:tailEnd type="arrow" w="med" len="med"/>
+          </a:ln>
+        </p:spPr>
+        <p:style>
+          <a:lnRef idx="1">
+            <a:schemeClr val="accent1"/>
+          </a:lnRef>
+          <a:fillRef idx="0">
+            <a:schemeClr val="accent1"/>
+          </a:fillRef>
+          <a:effectRef idx="0">
+            <a:schemeClr val="accent1"/>
+          </a:effectRef>
+          <a:fontRef idx="minor">
+            <a:schemeClr val="tx1"/>
+          </a:fontRef>
+        </p:style>
+      </p:cxnSp>
+      <p:grpSp>
+        <p:nvGrpSpPr>
+          <p:cNvPr id="22" name="グループ化 21"/>
+          <p:cNvGrpSpPr/>
+          <p:nvPr/>
+        </p:nvGrpSpPr>
+        <p:grpSpPr>
+          <a:xfrm>
+            <a:off x="3948011" y="4082618"/>
+            <a:ext cx="3863381" cy="2415723"/>
+            <a:chOff x="3763374" y="4181628"/>
+            <a:chExt cx="3863381" cy="2415723"/>
+          </a:xfrm>
+        </p:grpSpPr>
+        <p:grpSp>
+          <p:nvGrpSpPr>
+            <p:cNvPr id="23" name="グループ化 22"/>
+            <p:cNvGrpSpPr/>
+            <p:nvPr/>
+          </p:nvGrpSpPr>
+          <p:grpSpPr>
+            <a:xfrm>
+              <a:off x="3763374" y="4181628"/>
+              <a:ext cx="3863381" cy="2415723"/>
+              <a:chOff x="3052217" y="3670174"/>
+              <a:chExt cx="4867856" cy="3043810"/>
+            </a:xfrm>
+          </p:grpSpPr>
+          <p:grpSp>
+            <p:nvGrpSpPr>
+              <p:cNvPr id="25" name="グループ化 24"/>
+              <p:cNvGrpSpPr/>
+              <p:nvPr/>
+            </p:nvGrpSpPr>
+            <p:grpSpPr>
+              <a:xfrm>
+                <a:off x="3052217" y="3670174"/>
+                <a:ext cx="1728192" cy="3043810"/>
+                <a:chOff x="3052217" y="3670174"/>
+                <a:chExt cx="1728192" cy="3043810"/>
+              </a:xfrm>
+            </p:grpSpPr>
+            <p:grpSp>
+              <p:nvGrpSpPr>
+                <p:cNvPr id="27" name="グループ化 26"/>
+                <p:cNvGrpSpPr/>
+                <p:nvPr/>
+              </p:nvGrpSpPr>
+              <p:grpSpPr>
+                <a:xfrm>
+                  <a:off x="3052217" y="3670174"/>
+                  <a:ext cx="1728192" cy="3043810"/>
+                  <a:chOff x="3052217" y="3814190"/>
+                  <a:chExt cx="1728192" cy="3043810"/>
+                </a:xfrm>
+              </p:grpSpPr>
+              <p:sp>
+                <p:nvSpPr>
+                  <p:cNvPr id="29" name="フリーフォーム 28"/>
+                  <p:cNvSpPr/>
+                  <p:nvPr/>
+                </p:nvSpPr>
+                <p:spPr>
+                  <a:xfrm>
+                    <a:off x="3720520" y="3814190"/>
+                    <a:ext cx="406816" cy="1047750"/>
+                  </a:xfrm>
+                  <a:custGeom>
+                    <a:avLst/>
+                    <a:gdLst>
+                      <a:gd name="connsiteX0" fmla="*/ 119448 w 406816"/>
+                      <a:gd name="connsiteY0" fmla="*/ 0 h 1047750"/>
+                      <a:gd name="connsiteX1" fmla="*/ 405198 w 406816"/>
+                      <a:gd name="connsiteY1" fmla="*/ 342900 h 1047750"/>
+                      <a:gd name="connsiteX2" fmla="*/ 5148 w 406816"/>
+                      <a:gd name="connsiteY2" fmla="*/ 723900 h 1047750"/>
+                      <a:gd name="connsiteX3" fmla="*/ 214698 w 406816"/>
+                      <a:gd name="connsiteY3" fmla="*/ 1047750 h 1047750"/>
+                    </a:gdLst>
+                    <a:ahLst/>
+                    <a:cxnLst>
+                      <a:cxn ang="0">
+                        <a:pos x="connsiteX0" y="connsiteY0"/>
+                      </a:cxn>
+                      <a:cxn ang="0">
+                        <a:pos x="connsiteX1" y="connsiteY1"/>
+                      </a:cxn>
+                      <a:cxn ang="0">
+                        <a:pos x="connsiteX2" y="connsiteY2"/>
+                      </a:cxn>
+                      <a:cxn ang="0">
+                        <a:pos x="connsiteX3" y="connsiteY3"/>
+                      </a:cxn>
+                    </a:cxnLst>
+                    <a:rect l="l" t="t" r="r" b="b"/>
+                    <a:pathLst>
+                      <a:path w="406816" h="1047750">
+                        <a:moveTo>
+                          <a:pt x="119448" y="0"/>
+                        </a:moveTo>
+                        <a:cubicBezTo>
+                          <a:pt x="271848" y="111125"/>
+                          <a:pt x="424248" y="222250"/>
+                          <a:pt x="405198" y="342900"/>
+                        </a:cubicBezTo>
+                        <a:cubicBezTo>
+                          <a:pt x="386148" y="463550"/>
+                          <a:pt x="36898" y="606425"/>
+                          <a:pt x="5148" y="723900"/>
+                        </a:cubicBezTo>
+                        <a:cubicBezTo>
+                          <a:pt x="-26602" y="841375"/>
+                          <a:pt x="94048" y="944562"/>
+                          <a:pt x="214698" y="1047750"/>
+                        </a:cubicBezTo>
+                      </a:path>
+                    </a:pathLst>
+                  </a:custGeom>
+                  <a:ln w="38100">
+                    <a:solidFill>
+                      <a:schemeClr val="tx1"/>
+                    </a:solidFill>
+                    <a:headEnd type="none" w="med" len="med"/>
+                    <a:tailEnd type="arrow" w="med" len="med"/>
+                  </a:ln>
+                </p:spPr>
+                <p:style>
+                  <a:lnRef idx="1">
+                    <a:schemeClr val="accent1"/>
+                  </a:lnRef>
+                  <a:fillRef idx="0">
+                    <a:schemeClr val="accent1"/>
+                  </a:fillRef>
+                  <a:effectRef idx="0">
+                    <a:schemeClr val="accent1"/>
+                  </a:effectRef>
+                  <a:fontRef idx="minor">
+                    <a:schemeClr val="tx1"/>
+                  </a:fontRef>
+                </p:style>
+                <p:txBody>
+                  <a:bodyPr rtlCol="0" anchor="ctr"/>
+                  <a:lstStyle/>
+                  <a:p>
+                    <a:pPr algn="ctr"/>
+                    <a:endParaRPr kumimoji="1" lang="ja-JP" altLang="en-US"/>
+                  </a:p>
+                </p:txBody>
+              </p:sp>
+              <p:sp>
+                <p:nvSpPr>
+                  <p:cNvPr id="30" name="フローチャート : 代替処理 29"/>
+                  <p:cNvSpPr/>
+                  <p:nvPr/>
+                </p:nvSpPr>
+                <p:spPr>
+                  <a:xfrm>
+                    <a:off x="3052217" y="4869160"/>
+                    <a:ext cx="1728192" cy="1988840"/>
+                  </a:xfrm>
+                  <a:prstGeom prst="flowChartAlternateProcess">
+                    <a:avLst/>
+                  </a:prstGeom>
+                </p:spPr>
+                <p:style>
+                  <a:lnRef idx="1">
+                    <a:schemeClr val="accent2"/>
+                  </a:lnRef>
+                  <a:fillRef idx="2">
+                    <a:schemeClr val="accent2"/>
+                  </a:fillRef>
+                  <a:effectRef idx="1">
+                    <a:schemeClr val="accent2"/>
+                  </a:effectRef>
+                  <a:fontRef idx="minor">
+                    <a:schemeClr val="dk1"/>
+                  </a:fontRef>
+                </p:style>
+                <p:txBody>
+                  <a:bodyPr rtlCol="0" anchor="ctr"/>
+                  <a:lstStyle/>
+                  <a:p>
+                    <a:pPr algn="ctr"/>
+                    <a:endParaRPr kumimoji="1" lang="ja-JP" altLang="en-US" dirty="0">
+                      <a:latin typeface="メイリオ" pitchFamily="50" charset="-128"/>
+                      <a:ea typeface="メイリオ" pitchFamily="50" charset="-128"/>
+                      <a:cs typeface="メイリオ" pitchFamily="50" charset="-128"/>
+                    </a:endParaRPr>
+                  </a:p>
+                </p:txBody>
+              </p:sp>
+              <p:sp>
+                <p:nvSpPr>
+                  <p:cNvPr id="31" name="フローチャート : 代替処理 30"/>
+                  <p:cNvSpPr/>
+                  <p:nvPr/>
+                </p:nvSpPr>
+                <p:spPr>
+                  <a:xfrm>
+                    <a:off x="3203848" y="6093296"/>
+                    <a:ext cx="1440160" cy="648072"/>
+                  </a:xfrm>
+                  <a:prstGeom prst="flowChartAlternateProcess">
+                    <a:avLst/>
+                  </a:prstGeom>
+                </p:spPr>
+                <p:style>
+                  <a:lnRef idx="1">
+                    <a:schemeClr val="accent2"/>
+                  </a:lnRef>
+                  <a:fillRef idx="2">
+                    <a:schemeClr val="accent2"/>
+                  </a:fillRef>
+                  <a:effectRef idx="1">
+                    <a:schemeClr val="accent2"/>
+                  </a:effectRef>
+                  <a:fontRef idx="minor">
+                    <a:schemeClr val="dk1"/>
+                  </a:fontRef>
+                </p:style>
+                <p:txBody>
+                  <a:bodyPr rtlCol="0" anchor="ctr"/>
+                  <a:lstStyle/>
+                  <a:p>
+                    <a:pPr algn="ctr"/>
+                    <a:r>
+                      <a:rPr kumimoji="1" lang="ja-JP" altLang="en-US" sz="1400" dirty="0" smtClean="0">
+                        <a:latin typeface="メイリオ" pitchFamily="50" charset="-128"/>
+                        <a:ea typeface="メイリオ" pitchFamily="50" charset="-128"/>
+                        <a:cs typeface="メイリオ" pitchFamily="50" charset="-128"/>
+                      </a:rPr>
+                      <a:t>イブ</a:t>
+                    </a:r>
+                    <a:endParaRPr kumimoji="1" lang="en-US" altLang="ja-JP" sz="1400" dirty="0" smtClean="0">
+                      <a:latin typeface="メイリオ" pitchFamily="50" charset="-128"/>
+                      <a:ea typeface="メイリオ" pitchFamily="50" charset="-128"/>
+                      <a:cs typeface="メイリオ" pitchFamily="50" charset="-128"/>
+                    </a:endParaRPr>
+                  </a:p>
+                  <a:p>
+                    <a:pPr algn="ctr"/>
+                    <a:r>
+                      <a:rPr kumimoji="1" lang="ja-JP" altLang="en-US" sz="1400" dirty="0" smtClean="0">
+                        <a:latin typeface="メイリオ" pitchFamily="50" charset="-128"/>
+                        <a:ea typeface="メイリオ" pitchFamily="50" charset="-128"/>
+                        <a:cs typeface="メイリオ" pitchFamily="50" charset="-128"/>
+                      </a:rPr>
+                      <a:t>（盗聴者）</a:t>
+                    </a:r>
+                    <a:endParaRPr kumimoji="1" lang="ja-JP" altLang="en-US" sz="1400" dirty="0">
+                      <a:latin typeface="メイリオ" pitchFamily="50" charset="-128"/>
+                      <a:ea typeface="メイリオ" pitchFamily="50" charset="-128"/>
+                      <a:cs typeface="メイリオ" pitchFamily="50" charset="-128"/>
+                    </a:endParaRPr>
+                  </a:p>
+                </p:txBody>
+              </p:sp>
+            </p:grpSp>
+            <p:cxnSp>
+              <p:nvCxnSpPr>
+                <p:cNvPr id="28" name="直線矢印コネクタ 27"/>
+                <p:cNvCxnSpPr>
+                  <a:endCxn id="31" idx="0"/>
+                </p:cNvCxnSpPr>
+                <p:nvPr/>
+              </p:nvCxnSpPr>
+              <p:spPr>
+                <a:xfrm>
+                  <a:off x="3923928" y="5498229"/>
+                  <a:ext cx="0" cy="451051"/>
+                </a:xfrm>
+                <a:prstGeom prst="straightConnector1">
+                  <a:avLst/>
+                </a:prstGeom>
+                <a:ln w="38100">
+                  <a:solidFill>
+                    <a:schemeClr val="tx1"/>
+                  </a:solidFill>
+                  <a:tailEnd type="arrow"/>
+                </a:ln>
+              </p:spPr>
+              <p:style>
+                <a:lnRef idx="1">
+                  <a:schemeClr val="accent1"/>
+                </a:lnRef>
+                <a:fillRef idx="0">
+                  <a:schemeClr val="accent1"/>
+                </a:fillRef>
+                <a:effectRef idx="0">
+                  <a:schemeClr val="accent1"/>
+                </a:effectRef>
+                <a:fontRef idx="minor">
+                  <a:schemeClr val="tx1"/>
+                </a:fontRef>
+              </p:style>
+            </p:cxnSp>
+          </p:grpSp>
+          <p:sp>
+            <p:nvSpPr>
+              <p:cNvPr id="26" name="テキスト ボックス 25"/>
+              <p:cNvSpPr txBox="1"/>
+              <p:nvPr/>
+            </p:nvSpPr>
+            <p:spPr>
+              <a:xfrm>
+                <a:off x="4067945" y="4283804"/>
+                <a:ext cx="3852128" cy="426578"/>
+              </a:xfrm>
+              <a:prstGeom prst="rect">
+                <a:avLst/>
+              </a:prstGeom>
+              <a:noFill/>
+            </p:spPr>
+            <p:txBody>
+              <a:bodyPr wrap="none" rtlCol="0">
+                <a:spAutoFit/>
+              </a:bodyPr>
+              <a:lstStyle/>
+              <a:p>
+                <a:r>
+                  <a:rPr lang="ja-JP" altLang="en-US" sz="1600" dirty="0" smtClean="0">
+                    <a:latin typeface="メイリオ" pitchFamily="50" charset="-128"/>
+                    <a:ea typeface="メイリオ" pitchFamily="50" charset="-128"/>
+                    <a:cs typeface="メイリオ" pitchFamily="50" charset="-128"/>
+                  </a:rPr>
+                  <a:t>イブは暗号文しか盗聴できない</a:t>
+                </a:r>
+                <a:endParaRPr lang="en-US" altLang="ja-JP" sz="1600" dirty="0" smtClean="0">
+                  <a:latin typeface="メイリオ" pitchFamily="50" charset="-128"/>
+                  <a:ea typeface="メイリオ" pitchFamily="50" charset="-128"/>
+                  <a:cs typeface="メイリオ" pitchFamily="50" charset="-128"/>
+                </a:endParaRPr>
+              </a:p>
+            </p:txBody>
+          </p:sp>
+        </p:grpSp>
+        <p:sp>
+          <p:nvSpPr>
+            <p:cNvPr id="24" name="正方形/長方形 23"/>
+            <p:cNvSpPr/>
+            <p:nvPr/>
+          </p:nvSpPr>
+          <p:spPr>
+            <a:xfrm>
+              <a:off x="4031404" y="5205531"/>
+              <a:ext cx="835521" cy="426333"/>
+            </a:xfrm>
+            <a:prstGeom prst="rect">
+              <a:avLst/>
+            </a:prstGeom>
+          </p:spPr>
+          <p:style>
+            <a:lnRef idx="1">
+              <a:schemeClr val="accent5"/>
+            </a:lnRef>
+            <a:fillRef idx="2">
+              <a:schemeClr val="accent5"/>
+            </a:fillRef>
+            <a:effectRef idx="1">
+              <a:schemeClr val="accent5"/>
+            </a:effectRef>
+            <a:fontRef idx="minor">
+              <a:schemeClr val="dk1"/>
+            </a:fontRef>
+          </p:style>
+          <p:txBody>
+            <a:bodyPr wrap="none" rtlCol="0" anchor="ctr"/>
+            <a:lstStyle/>
+            <a:p>
+              <a:pPr algn="ctr"/>
+              <a:r>
+                <a:rPr lang="ja-JP" altLang="en-US" sz="1400" dirty="0">
+                  <a:latin typeface="メイリオ" pitchFamily="50" charset="-128"/>
+                  <a:ea typeface="メイリオ" pitchFamily="50" charset="-128"/>
+                  <a:cs typeface="メイリオ" pitchFamily="50" charset="-128"/>
+                </a:rPr>
+                <a:t>暗号文</a:t>
+              </a:r>
+              <a:endParaRPr kumimoji="1" lang="en-US" altLang="ja-JP" sz="1400" dirty="0" smtClean="0">
+                <a:latin typeface="メイリオ" pitchFamily="50" charset="-128"/>
+                <a:ea typeface="メイリオ" pitchFamily="50" charset="-128"/>
+                <a:cs typeface="メイリオ" pitchFamily="50" charset="-128"/>
+              </a:endParaRPr>
+            </a:p>
+          </p:txBody>
+        </p:sp>
+      </p:grpSp>
+    </p:spTree>
+    <p:extLst>
+      <p:ext uri="{BB962C8B-B14F-4D97-AF65-F5344CB8AC3E}">
+        <p14:creationId xmlns:p14="http://schemas.microsoft.com/office/powerpoint/2010/main" val="3833565505"/>
       </p:ext>
     </p:extLst>
   </p:cSld>

</xml_diff>